<commit_message>
Update für Semester 2017
</commit_message>
<xml_diff>
--- a/folien/Semester_03_Termin_01_Intro.pptx
+++ b/folien/Semester_03_Termin_01_Intro.pptx
@@ -178,6 +178,10 @@
     </p:ext>
   </p:extLst>
 </p:presentation>
+</file>
+
+<file path=ppt/revisionInfo.xml><?xml version="1.0" encoding="utf-8"?>
+<p1510:revInfo xmlns:a="http://schemas.openxmlformats.org/drawingml/2006/main" xmlns:r="http://schemas.openxmlformats.org/officeDocument/2006/relationships" xmlns:p1510="http://schemas.microsoft.com/office/powerpoint/2015/10/main"/>
 </file>
 
 <file path=ppt/notesMasters/notesMaster1.xml><?xml version="1.0" encoding="utf-8"?>
@@ -6784,36 +6788,40 @@
       </p:grpSpPr>
       <p:pic>
         <p:nvPicPr>
-          <p:cNvPr id="5122" name="Grafik 1"/>
+          <p:cNvPr id="2" name="Grafik 1">
+            <a:extLst>
+              <a:ext uri="{FF2B5EF4-FFF2-40B4-BE49-F238E27FC236}">
+                <a16:creationId xmlns:a16="http://schemas.microsoft.com/office/drawing/2014/main" id="{EA0C0ECA-8D77-42B4-AC98-E76DD5ACF560}"/>
+              </a:ext>
+            </a:extLst>
+          </p:cNvPr>
           <p:cNvPicPr>
             <a:picLocks noChangeAspect="1"/>
           </p:cNvPicPr>
           <p:nvPr/>
         </p:nvPicPr>
         <p:blipFill>
-          <a:blip r:embed="rId2" cstate="print">
-            <a:grayscl/>
+          <a:blip r:embed="rId2">
+            <a:duotone>
+              <a:schemeClr val="accent4">
+                <a:shade val="45000"/>
+                <a:satMod val="135000"/>
+              </a:schemeClr>
+              <a:prstClr val="white"/>
+            </a:duotone>
           </a:blip>
-          <a:srcRect/>
           <a:stretch>
             <a:fillRect/>
           </a:stretch>
         </p:blipFill>
-        <p:spPr bwMode="auto">
+        <p:spPr>
           <a:xfrm>
-            <a:off x="503238" y="1778000"/>
-            <a:ext cx="3600450" cy="5218113"/>
+            <a:off x="48282" y="1722111"/>
+            <a:ext cx="4199942" cy="5802142"/>
           </a:xfrm>
           <a:prstGeom prst="rect">
             <a:avLst/>
           </a:prstGeom>
-          <a:noFill/>
-          <a:ln w="9525">
-            <a:noFill/>
-            <a:miter lim="800000"/>
-            <a:headEnd/>
-            <a:tailEnd/>
-          </a:ln>
         </p:spPr>
       </p:pic>
       <p:sp>
@@ -8146,7 +8154,7 @@
             </a:pPr>
             <a:r>
               <a:rPr lang="de-DE" altLang="de-DE" dirty="0"/>
-              <a:t>die Vorlesungen </a:t>
+              <a:t>die Vorlesung am </a:t>
             </a:r>
             <a:r>
               <a:rPr lang="de-DE" altLang="de-DE" dirty="0">
@@ -8154,23 +8162,11 @@
                   <a:srgbClr val="FF0000"/>
                 </a:solidFill>
               </a:rPr>
-              <a:t>15.11.</a:t>
+              <a:t>30.11.</a:t>
             </a:r>
             <a:r>
               <a:rPr lang="de-DE" altLang="de-DE" dirty="0"/>
-              <a:t> und </a:t>
-            </a:r>
-            <a:r>
-              <a:rPr lang="de-DE" altLang="de-DE" dirty="0">
-                <a:solidFill>
-                  <a:srgbClr val="FF0000"/>
-                </a:solidFill>
-              </a:rPr>
-              <a:t>29.11.</a:t>
-            </a:r>
-            <a:r>
-              <a:rPr lang="de-DE" altLang="de-DE" dirty="0"/>
-              <a:t> wurden verlegt</a:t>
+              <a:t> muss verlegt werden</a:t>
             </a:r>
           </a:p>
           <a:p>
@@ -8199,37 +8195,8 @@
             </a:pPr>
             <a:r>
               <a:rPr lang="de-DE" altLang="de-DE" dirty="0"/>
-              <a:t>auf </a:t>
-            </a:r>
-            <a:r>
-              <a:rPr lang="de-DE" altLang="de-DE" b="1" dirty="0">
-                <a:solidFill>
-                  <a:srgbClr val="00B050"/>
-                </a:solidFill>
-              </a:rPr>
-              <a:t>Freitag den 21.10.</a:t>
-            </a:r>
-            <a:r>
-              <a:rPr lang="de-DE" altLang="de-DE" dirty="0"/>
-              <a:t> und </a:t>
-            </a:r>
-            <a:r>
-              <a:rPr lang="de-DE" altLang="de-DE" b="1" dirty="0">
-                <a:solidFill>
-                  <a:srgbClr val="00B050"/>
-                </a:solidFill>
-              </a:rPr>
-              <a:t>02.12.</a:t>
-            </a:r>
-            <a:r>
-              <a:rPr lang="de-DE" altLang="de-DE" dirty="0"/>
-              <a:t> </a:t>
-            </a:r>
-            <a:r>
-              <a:rPr lang="de-DE" altLang="de-DE" sz="2400" dirty="0"/>
-              <a:t>(auch 9:15-12:00)</a:t>
-            </a:r>
-            <a:endParaRPr lang="de-DE" altLang="de-DE" dirty="0"/>
+              <a:t>Suche nach Ersatztermin läuft…</a:t>
+            </a:r>
           </a:p>
           <a:p>
             <a:pPr marL="269875" indent="-269875" eaLnBrk="1">
@@ -9385,7 +9352,6 @@
               <a:rPr lang="en-GB" altLang="de-DE" sz="2400" dirty="0"/>
               <a:t>)</a:t>
             </a:r>
-            <a:endParaRPr lang="en-GB" altLang="de-DE" sz="2400" dirty="0"/>
           </a:p>
           <a:p>
             <a:pPr marL="269875" indent="-269875" eaLnBrk="1">

</xml_diff>